<commit_message>
Intro to Inheritance updated
</commit_message>
<xml_diff>
--- a/slides/On-Campus/07_03_Inheritance.pptx
+++ b/slides/On-Campus/07_03_Inheritance.pptx
@@ -154,267 +154,20 @@
     <pc:chgData name="Marcia Moraes" userId="c9c67e8a-58e2-4733-9a1c-5d44fec4775b" providerId="ADAL" clId="{7A3B5759-C5AE-4F4B-A123-A71CEDFB2A85}"/>
   </pc:docChgLst>
   <pc:docChgLst>
-    <pc:chgData name="Marcia Moraes" userId="c9c67e8a-58e2-4733-9a1c-5d44fec4775b" providerId="ADAL" clId="{FFA5543F-4D04-47EB-B450-89416CE2F2D2}"/>
-    <pc:docChg chg="custSel modSld">
-      <pc:chgData name="Marcia Moraes" userId="c9c67e8a-58e2-4733-9a1c-5d44fec4775b" providerId="ADAL" clId="{FFA5543F-4D04-47EB-B450-89416CE2F2D2}" dt="2023-09-14T15:43:40.234" v="171" actId="1076"/>
+    <pc:chgData name="Marcia Moraes" userId="c9c67e8a-58e2-4733-9a1c-5d44fec4775b" providerId="ADAL" clId="{5DBC6ECF-636D-48D3-8B2B-561FEC98290E}"/>
+    <pc:docChg chg="modSld">
+      <pc:chgData name="Marcia Moraes" userId="c9c67e8a-58e2-4733-9a1c-5d44fec4775b" providerId="ADAL" clId="{5DBC6ECF-636D-48D3-8B2B-561FEC98290E}" dt="2024-02-16T17:46:25.001" v="1" actId="20577"/>
       <pc:docMkLst>
         <pc:docMk/>
       </pc:docMkLst>
       <pc:sldChg chg="modSp">
-        <pc:chgData name="Marcia Moraes" userId="c9c67e8a-58e2-4733-9a1c-5d44fec4775b" providerId="ADAL" clId="{FFA5543F-4D04-47EB-B450-89416CE2F2D2}" dt="2023-09-14T15:42:39.435" v="163" actId="255"/>
-        <pc:sldMkLst>
-          <pc:docMk/>
-          <pc:sldMk cId="4031683521" sldId="257"/>
-        </pc:sldMkLst>
-        <pc:spChg chg="mod">
-          <ac:chgData name="Marcia Moraes" userId="c9c67e8a-58e2-4733-9a1c-5d44fec4775b" providerId="ADAL" clId="{FFA5543F-4D04-47EB-B450-89416CE2F2D2}" dt="2023-09-14T15:42:39.435" v="163" actId="255"/>
-          <ac:spMkLst>
-            <pc:docMk/>
-            <pc:sldMk cId="4031683521" sldId="257"/>
-            <ac:spMk id="5" creationId="{DDFDC286-5F2E-A744-9400-818045889D9E}"/>
-          </ac:spMkLst>
-        </pc:spChg>
-      </pc:sldChg>
-      <pc:sldChg chg="modSp">
-        <pc:chgData name="Marcia Moraes" userId="c9c67e8a-58e2-4733-9a1c-5d44fec4775b" providerId="ADAL" clId="{FFA5543F-4D04-47EB-B450-89416CE2F2D2}" dt="2023-09-14T15:42:52.206" v="164" actId="255"/>
-        <pc:sldMkLst>
-          <pc:docMk/>
-          <pc:sldMk cId="602393919" sldId="259"/>
-        </pc:sldMkLst>
-        <pc:spChg chg="mod">
-          <ac:chgData name="Marcia Moraes" userId="c9c67e8a-58e2-4733-9a1c-5d44fec4775b" providerId="ADAL" clId="{FFA5543F-4D04-47EB-B450-89416CE2F2D2}" dt="2023-09-14T15:42:52.206" v="164" actId="255"/>
-          <ac:spMkLst>
-            <pc:docMk/>
-            <pc:sldMk cId="602393919" sldId="259"/>
-            <ac:spMk id="3" creationId="{98D78EC2-9F67-E240-B2FA-C686DD2B30EA}"/>
-          </ac:spMkLst>
-        </pc:spChg>
-      </pc:sldChg>
-      <pc:sldChg chg="modSp">
-        <pc:chgData name="Marcia Moraes" userId="c9c67e8a-58e2-4733-9a1c-5d44fec4775b" providerId="ADAL" clId="{FFA5543F-4D04-47EB-B450-89416CE2F2D2}" dt="2023-09-14T15:43:02.927" v="165" actId="255"/>
-        <pc:sldMkLst>
-          <pc:docMk/>
-          <pc:sldMk cId="2558376359" sldId="260"/>
-        </pc:sldMkLst>
-        <pc:spChg chg="mod">
-          <ac:chgData name="Marcia Moraes" userId="c9c67e8a-58e2-4733-9a1c-5d44fec4775b" providerId="ADAL" clId="{FFA5543F-4D04-47EB-B450-89416CE2F2D2}" dt="2023-09-14T15:43:02.927" v="165" actId="255"/>
-          <ac:spMkLst>
-            <pc:docMk/>
-            <pc:sldMk cId="2558376359" sldId="260"/>
-            <ac:spMk id="3" creationId="{C4E5E1A7-90FB-344C-B636-B46CD6ACE694}"/>
-          </ac:spMkLst>
-        </pc:spChg>
-      </pc:sldChg>
-      <pc:sldChg chg="modSp">
-        <pc:chgData name="Marcia Moraes" userId="c9c67e8a-58e2-4733-9a1c-5d44fec4775b" providerId="ADAL" clId="{FFA5543F-4D04-47EB-B450-89416CE2F2D2}" dt="2023-09-14T15:43:40.234" v="171" actId="1076"/>
-        <pc:sldMkLst>
-          <pc:docMk/>
-          <pc:sldMk cId="1733493820" sldId="261"/>
-        </pc:sldMkLst>
-        <pc:spChg chg="mod">
-          <ac:chgData name="Marcia Moraes" userId="c9c67e8a-58e2-4733-9a1c-5d44fec4775b" providerId="ADAL" clId="{FFA5543F-4D04-47EB-B450-89416CE2F2D2}" dt="2023-09-14T15:43:18.569" v="168" actId="1076"/>
-          <ac:spMkLst>
-            <pc:docMk/>
-            <pc:sldMk cId="1733493820" sldId="261"/>
-            <ac:spMk id="2" creationId="{BB603104-1407-1C41-B43E-DCB96FDAA3E0}"/>
-          </ac:spMkLst>
-        </pc:spChg>
-        <pc:spChg chg="mod">
-          <ac:chgData name="Marcia Moraes" userId="c9c67e8a-58e2-4733-9a1c-5d44fec4775b" providerId="ADAL" clId="{FFA5543F-4D04-47EB-B450-89416CE2F2D2}" dt="2023-09-14T15:43:23.214" v="169" actId="1076"/>
-          <ac:spMkLst>
-            <pc:docMk/>
-            <pc:sldMk cId="1733493820" sldId="261"/>
-            <ac:spMk id="3" creationId="{A7958EE0-B31E-BA49-9C67-068BEED827B1}"/>
-          </ac:spMkLst>
-        </pc:spChg>
-        <pc:spChg chg="mod">
-          <ac:chgData name="Marcia Moraes" userId="c9c67e8a-58e2-4733-9a1c-5d44fec4775b" providerId="ADAL" clId="{FFA5543F-4D04-47EB-B450-89416CE2F2D2}" dt="2023-09-14T15:43:40.234" v="171" actId="1076"/>
-          <ac:spMkLst>
-            <pc:docMk/>
-            <pc:sldMk cId="1733493820" sldId="261"/>
-            <ac:spMk id="21" creationId="{85349B9A-CA81-7B4E-8DF2-C45135212713}"/>
-          </ac:spMkLst>
-        </pc:spChg>
-      </pc:sldChg>
-      <pc:sldChg chg="modSp">
-        <pc:chgData name="Marcia Moraes" userId="c9c67e8a-58e2-4733-9a1c-5d44fec4775b" providerId="ADAL" clId="{FFA5543F-4D04-47EB-B450-89416CE2F2D2}" dt="2023-09-14T15:38:57.619" v="137" actId="1076"/>
-        <pc:sldMkLst>
-          <pc:docMk/>
-          <pc:sldMk cId="456769797" sldId="262"/>
-        </pc:sldMkLst>
-        <pc:spChg chg="mod">
-          <ac:chgData name="Marcia Moraes" userId="c9c67e8a-58e2-4733-9a1c-5d44fec4775b" providerId="ADAL" clId="{FFA5543F-4D04-47EB-B450-89416CE2F2D2}" dt="2023-09-14T15:38:57.619" v="137" actId="1076"/>
-          <ac:spMkLst>
-            <pc:docMk/>
-            <pc:sldMk cId="456769797" sldId="262"/>
-            <ac:spMk id="3" creationId="{6C960DAE-B88B-406F-8FDA-8C28CFA755D0}"/>
-          </ac:spMkLst>
-        </pc:spChg>
-        <pc:spChg chg="mod">
-          <ac:chgData name="Marcia Moraes" userId="c9c67e8a-58e2-4733-9a1c-5d44fec4775b" providerId="ADAL" clId="{FFA5543F-4D04-47EB-B450-89416CE2F2D2}" dt="2023-09-14T15:38:44.534" v="134" actId="1076"/>
-          <ac:spMkLst>
-            <pc:docMk/>
-            <pc:sldMk cId="456769797" sldId="262"/>
-            <ac:spMk id="5" creationId="{DDFDC286-5F2E-A744-9400-818045889D9E}"/>
-          </ac:spMkLst>
-        </pc:spChg>
-      </pc:sldChg>
-      <pc:sldChg chg="modSp">
-        <pc:chgData name="Marcia Moraes" userId="c9c67e8a-58e2-4733-9a1c-5d44fec4775b" providerId="ADAL" clId="{FFA5543F-4D04-47EB-B450-89416CE2F2D2}" dt="2023-09-14T15:40:32.061" v="149" actId="255"/>
-        <pc:sldMkLst>
-          <pc:docMk/>
-          <pc:sldMk cId="2153849856" sldId="263"/>
-        </pc:sldMkLst>
-        <pc:spChg chg="mod">
-          <ac:chgData name="Marcia Moraes" userId="c9c67e8a-58e2-4733-9a1c-5d44fec4775b" providerId="ADAL" clId="{FFA5543F-4D04-47EB-B450-89416CE2F2D2}" dt="2023-09-14T15:39:18.686" v="141" actId="1076"/>
-          <ac:spMkLst>
-            <pc:docMk/>
-            <pc:sldMk cId="2153849856" sldId="263"/>
-            <ac:spMk id="4" creationId="{7BC75B87-C129-C04D-B73A-32C854FEB28B}"/>
-          </ac:spMkLst>
-        </pc:spChg>
-        <pc:spChg chg="mod">
-          <ac:chgData name="Marcia Moraes" userId="c9c67e8a-58e2-4733-9a1c-5d44fec4775b" providerId="ADAL" clId="{FFA5543F-4D04-47EB-B450-89416CE2F2D2}" dt="2023-09-14T15:39:14.999" v="139" actId="1076"/>
-          <ac:spMkLst>
-            <pc:docMk/>
-            <pc:sldMk cId="2153849856" sldId="263"/>
-            <ac:spMk id="5" creationId="{DDFDC286-5F2E-A744-9400-818045889D9E}"/>
-          </ac:spMkLst>
-        </pc:spChg>
-        <pc:spChg chg="mod">
-          <ac:chgData name="Marcia Moraes" userId="c9c67e8a-58e2-4733-9a1c-5d44fec4775b" providerId="ADAL" clId="{FFA5543F-4D04-47EB-B450-89416CE2F2D2}" dt="2023-09-14T15:39:52.906" v="144" actId="1076"/>
-          <ac:spMkLst>
-            <pc:docMk/>
-            <pc:sldMk cId="2153849856" sldId="263"/>
-            <ac:spMk id="6" creationId="{E59756DE-2A5E-4103-98F0-389EF50F897B}"/>
-          </ac:spMkLst>
-        </pc:spChg>
-        <pc:spChg chg="mod">
-          <ac:chgData name="Marcia Moraes" userId="c9c67e8a-58e2-4733-9a1c-5d44fec4775b" providerId="ADAL" clId="{FFA5543F-4D04-47EB-B450-89416CE2F2D2}" dt="2023-09-14T15:40:32.061" v="149" actId="255"/>
-          <ac:spMkLst>
-            <pc:docMk/>
-            <pc:sldMk cId="2153849856" sldId="263"/>
-            <ac:spMk id="7" creationId="{D1D43643-09D8-4488-BB22-A443216664C6}"/>
-          </ac:spMkLst>
-        </pc:spChg>
-      </pc:sldChg>
-      <pc:sldChg chg="modSp">
-        <pc:chgData name="Marcia Moraes" userId="c9c67e8a-58e2-4733-9a1c-5d44fec4775b" providerId="ADAL" clId="{FFA5543F-4D04-47EB-B450-89416CE2F2D2}" dt="2023-09-14T15:41:02.387" v="154" actId="255"/>
-        <pc:sldMkLst>
-          <pc:docMk/>
-          <pc:sldMk cId="2016202707" sldId="264"/>
-        </pc:sldMkLst>
-        <pc:spChg chg="mod">
-          <ac:chgData name="Marcia Moraes" userId="c9c67e8a-58e2-4733-9a1c-5d44fec4775b" providerId="ADAL" clId="{FFA5543F-4D04-47EB-B450-89416CE2F2D2}" dt="2023-09-14T15:40:46.534" v="151" actId="1076"/>
-          <ac:spMkLst>
-            <pc:docMk/>
-            <pc:sldMk cId="2016202707" sldId="264"/>
-            <ac:spMk id="5" creationId="{DDFDC286-5F2E-A744-9400-818045889D9E}"/>
-          </ac:spMkLst>
-        </pc:spChg>
-        <pc:spChg chg="mod">
-          <ac:chgData name="Marcia Moraes" userId="c9c67e8a-58e2-4733-9a1c-5d44fec4775b" providerId="ADAL" clId="{FFA5543F-4D04-47EB-B450-89416CE2F2D2}" dt="2023-09-14T15:40:57.209" v="153" actId="1076"/>
-          <ac:spMkLst>
-            <pc:docMk/>
-            <pc:sldMk cId="2016202707" sldId="264"/>
-            <ac:spMk id="8" creationId="{97573F1E-A8C4-477C-98EF-22E5460CBF0E}"/>
-          </ac:spMkLst>
-        </pc:spChg>
-        <pc:spChg chg="mod">
-          <ac:chgData name="Marcia Moraes" userId="c9c67e8a-58e2-4733-9a1c-5d44fec4775b" providerId="ADAL" clId="{FFA5543F-4D04-47EB-B450-89416CE2F2D2}" dt="2023-09-14T15:41:02.387" v="154" actId="255"/>
-          <ac:spMkLst>
-            <pc:docMk/>
-            <pc:sldMk cId="2016202707" sldId="264"/>
-            <ac:spMk id="11" creationId="{876AB1C7-B71F-467E-8C2D-24823FD80EE7}"/>
-          </ac:spMkLst>
-        </pc:spChg>
-      </pc:sldChg>
-      <pc:sldChg chg="modSp">
-        <pc:chgData name="Marcia Moraes" userId="c9c67e8a-58e2-4733-9a1c-5d44fec4775b" providerId="ADAL" clId="{FFA5543F-4D04-47EB-B450-89416CE2F2D2}" dt="2023-09-14T15:41:39.974" v="158" actId="1076"/>
-        <pc:sldMkLst>
-          <pc:docMk/>
-          <pc:sldMk cId="2838885280" sldId="266"/>
-        </pc:sldMkLst>
-        <pc:spChg chg="mod">
-          <ac:chgData name="Marcia Moraes" userId="c9c67e8a-58e2-4733-9a1c-5d44fec4775b" providerId="ADAL" clId="{FFA5543F-4D04-47EB-B450-89416CE2F2D2}" dt="2023-09-14T15:41:29.666" v="156" actId="1076"/>
-          <ac:spMkLst>
-            <pc:docMk/>
-            <pc:sldMk cId="2838885280" sldId="266"/>
-            <ac:spMk id="5" creationId="{DDFDC286-5F2E-A744-9400-818045889D9E}"/>
-          </ac:spMkLst>
-        </pc:spChg>
-        <pc:spChg chg="mod">
-          <ac:chgData name="Marcia Moraes" userId="c9c67e8a-58e2-4733-9a1c-5d44fec4775b" providerId="ADAL" clId="{FFA5543F-4D04-47EB-B450-89416CE2F2D2}" dt="2023-09-14T15:41:39.974" v="158" actId="1076"/>
-          <ac:spMkLst>
-            <pc:docMk/>
-            <pc:sldMk cId="2838885280" sldId="266"/>
-            <ac:spMk id="14" creationId="{E766F170-FD35-4D06-AAD6-F58B1719111A}"/>
-          </ac:spMkLst>
-        </pc:spChg>
-      </pc:sldChg>
-      <pc:sldChg chg="modSp">
-        <pc:chgData name="Marcia Moraes" userId="c9c67e8a-58e2-4733-9a1c-5d44fec4775b" providerId="ADAL" clId="{FFA5543F-4D04-47EB-B450-89416CE2F2D2}" dt="2023-09-14T15:42:07.352" v="162" actId="255"/>
-        <pc:sldMkLst>
-          <pc:docMk/>
-          <pc:sldMk cId="1054478833" sldId="267"/>
-        </pc:sldMkLst>
-        <pc:spChg chg="mod">
-          <ac:chgData name="Marcia Moraes" userId="c9c67e8a-58e2-4733-9a1c-5d44fec4775b" providerId="ADAL" clId="{FFA5543F-4D04-47EB-B450-89416CE2F2D2}" dt="2023-09-14T15:42:00.788" v="160" actId="1076"/>
-          <ac:spMkLst>
-            <pc:docMk/>
-            <pc:sldMk cId="1054478833" sldId="267"/>
-            <ac:spMk id="5" creationId="{DDFDC286-5F2E-A744-9400-818045889D9E}"/>
-          </ac:spMkLst>
-        </pc:spChg>
-        <pc:spChg chg="mod">
-          <ac:chgData name="Marcia Moraes" userId="c9c67e8a-58e2-4733-9a1c-5d44fec4775b" providerId="ADAL" clId="{FFA5543F-4D04-47EB-B450-89416CE2F2D2}" dt="2023-09-14T15:42:07.352" v="162" actId="255"/>
-          <ac:spMkLst>
-            <pc:docMk/>
-            <pc:sldMk cId="1054478833" sldId="267"/>
-            <ac:spMk id="8" creationId="{19C255FD-0EE1-499D-919E-CFC825642644}"/>
-          </ac:spMkLst>
-        </pc:spChg>
-      </pc:sldChg>
-      <pc:sldChg chg="addSp modSp">
-        <pc:chgData name="Marcia Moraes" userId="c9c67e8a-58e2-4733-9a1c-5d44fec4775b" providerId="ADAL" clId="{FFA5543F-4D04-47EB-B450-89416CE2F2D2}" dt="2023-09-14T15:38:14.432" v="132" actId="1076"/>
+        <pc:chgData name="Marcia Moraes" userId="c9c67e8a-58e2-4733-9a1c-5d44fec4775b" providerId="ADAL" clId="{5DBC6ECF-636D-48D3-8B2B-561FEC98290E}" dt="2024-02-16T17:46:25.001" v="1" actId="20577"/>
         <pc:sldMkLst>
           <pc:docMk/>
           <pc:sldMk cId="2571368551" sldId="272"/>
         </pc:sldMkLst>
-        <pc:spChg chg="mod">
-          <ac:chgData name="Marcia Moraes" userId="c9c67e8a-58e2-4733-9a1c-5d44fec4775b" providerId="ADAL" clId="{FFA5543F-4D04-47EB-B450-89416CE2F2D2}" dt="2023-09-14T15:37:52.435" v="129" actId="1076"/>
-          <ac:spMkLst>
-            <pc:docMk/>
-            <pc:sldMk cId="2571368551" sldId="272"/>
-            <ac:spMk id="4" creationId="{119AD8F2-D5DB-A84B-A5B3-F7935E3E6D1D}"/>
-          </ac:spMkLst>
-        </pc:spChg>
-        <pc:spChg chg="mod">
-          <ac:chgData name="Marcia Moraes" userId="c9c67e8a-58e2-4733-9a1c-5d44fec4775b" providerId="ADAL" clId="{FFA5543F-4D04-47EB-B450-89416CE2F2D2}" dt="2023-09-14T15:36:56.854" v="0" actId="1076"/>
-          <ac:spMkLst>
-            <pc:docMk/>
-            <pc:sldMk cId="2571368551" sldId="272"/>
-            <ac:spMk id="6" creationId="{A2494937-C0C7-4ABC-A6FF-48F67C26DCCE}"/>
-          </ac:spMkLst>
-        </pc:spChg>
-        <pc:spChg chg="add">
-          <ac:chgData name="Marcia Moraes" userId="c9c67e8a-58e2-4733-9a1c-5d44fec4775b" providerId="ADAL" clId="{FFA5543F-4D04-47EB-B450-89416CE2F2D2}" dt="2023-09-14T15:37:41.153" v="127"/>
-          <ac:spMkLst>
-            <pc:docMk/>
-            <pc:sldMk cId="2571368551" sldId="272"/>
-            <ac:spMk id="8" creationId="{D76BB3E1-5623-474B-A458-C2159FA9FFB5}"/>
-          </ac:spMkLst>
-        </pc:spChg>
-        <pc:spChg chg="mod">
-          <ac:chgData name="Marcia Moraes" userId="c9c67e8a-58e2-4733-9a1c-5d44fec4775b" providerId="ADAL" clId="{FFA5543F-4D04-47EB-B450-89416CE2F2D2}" dt="2023-09-14T15:38:14.432" v="132" actId="1076"/>
-          <ac:spMkLst>
-            <pc:docMk/>
-            <pc:sldMk cId="2571368551" sldId="272"/>
-            <ac:spMk id="11" creationId="{BDA0DBC1-29A7-4498-B9AA-9B174D0FEC3E}"/>
-          </ac:spMkLst>
-        </pc:spChg>
-        <pc:graphicFrameChg chg="add">
-          <ac:chgData name="Marcia Moraes" userId="c9c67e8a-58e2-4733-9a1c-5d44fec4775b" providerId="ADAL" clId="{FFA5543F-4D04-47EB-B450-89416CE2F2D2}" dt="2023-09-14T15:37:41.153" v="127"/>
+        <pc:graphicFrameChg chg="modGraphic">
+          <ac:chgData name="Marcia Moraes" userId="c9c67e8a-58e2-4733-9a1c-5d44fec4775b" providerId="ADAL" clId="{5DBC6ECF-636D-48D3-8B2B-561FEC98290E}" dt="2024-02-16T17:46:25.001" v="1" actId="20577"/>
           <ac:graphicFrameMkLst>
             <pc:docMk/>
             <pc:sldMk cId="2571368551" sldId="272"/>
@@ -423,6 +176,9 @@
         </pc:graphicFrameChg>
       </pc:sldChg>
     </pc:docChg>
+  </pc:docChgLst>
+  <pc:docChgLst>
+    <pc:chgData name="Marcia Moraes" userId="c9c67e8a-58e2-4733-9a1c-5d44fec4775b" providerId="ADAL" clId="{FFA5543F-4D04-47EB-B450-89416CE2F2D2}"/>
   </pc:docChgLst>
 </pc:chgInfo>
 </file>
@@ -509,7 +265,7 @@
           <a:p>
             <a:fld id="{4D7E51A5-B478-1E40-8CBB-0DAA8831E99D}" type="datetimeFigureOut">
               <a:rPr lang="en-US" smtClean="0"/>
-              <a:t>9/14/2023</a:t>
+              <a:t>2/16/2024</a:t>
             </a:fld>
             <a:endParaRPr lang="en-US"/>
           </a:p>
@@ -674,7 +430,7 @@
           <a:p>
             <a:fld id="{D0ED587F-861E-6740-9643-E3DDAE89B8D6}" type="datetimeFigureOut">
               <a:rPr lang="en-US" smtClean="0"/>
-              <a:t>9/14/2023</a:t>
+              <a:t>2/16/2024</a:t>
             </a:fld>
             <a:endParaRPr lang="en-US"/>
           </a:p>
@@ -22729,7 +22485,7 @@
           <p:nvPr>
             <p:extLst>
               <p:ext uri="{D42A27DB-BD31-4B8C-83A1-F6EECF244321}">
-                <p14:modId xmlns:p14="http://schemas.microsoft.com/office/powerpoint/2010/main" val="3495294103"/>
+                <p14:modId xmlns:p14="http://schemas.microsoft.com/office/powerpoint/2010/main" val="521787058"/>
               </p:ext>
             </p:extLst>
           </p:nvPr>
@@ -22945,10 +22701,10 @@
                     <a:lstStyle/>
                     <a:p>
                       <a:r>
-                        <a:rPr lang="en-US" sz="1700">
+                        <a:rPr lang="en-US" sz="1700" dirty="0">
                           <a:effectLst/>
                         </a:rPr>
-                        <a:t>12 PM - 2 PM : CSB 120</a:t>
+                        <a:t>2 PM - 5 PM : CSB 120</a:t>
                       </a:r>
                     </a:p>
                   </a:txBody>
@@ -34931,6 +34687,14 @@
 </file>
 
 <file path=customXml/item1.xml><?xml version="1.0" encoding="utf-8"?>
+<p:properties xmlns:p="http://schemas.microsoft.com/office/2006/metadata/properties" xmlns:xsi="http://www.w3.org/2001/XMLSchema-instance" xmlns:pc="http://schemas.microsoft.com/office/infopath/2007/PartnerControls">
+  <documentManagement>
+    <_activity xmlns="92c41bee-f0ee-4aa6-9399-a35fbb883510" xsi:nil="true"/>
+  </documentManagement>
+</p:properties>
+</file>
+
+<file path=customXml/item2.xml><?xml version="1.0" encoding="utf-8"?>
 <ct:contentTypeSchema xmlns:ct="http://schemas.microsoft.com/office/2006/metadata/contentType" xmlns:ma="http://schemas.microsoft.com/office/2006/metadata/properties/metaAttributes" ct:_="" ma:_="" ma:contentTypeName="Document" ma:contentTypeID="0x010100074387D78AC76C4289401EF66FB51FCC" ma:contentTypeVersion="15" ma:contentTypeDescription="Create a new document." ma:contentTypeScope="" ma:versionID="d3659bec8b8330148a03d82a9d99f412">
   <xsd:schema xmlns:xsd="http://www.w3.org/2001/XMLSchema" xmlns:xs="http://www.w3.org/2001/XMLSchema" xmlns:p="http://schemas.microsoft.com/office/2006/metadata/properties" xmlns:ns3="92c41bee-f0ee-4aa6-9399-a35fbb883510" xmlns:ns4="e06ed288-fd75-4b50-bbed-f5a5df88c31c" targetNamespace="http://schemas.microsoft.com/office/2006/metadata/properties" ma:root="true" ma:fieldsID="1a21d371127b63848c9a2290f5945250" ns3:_="" ns4:_="">
     <xsd:import namespace="92c41bee-f0ee-4aa6-9399-a35fbb883510"/>
@@ -35165,14 +34929,6 @@
 </ct:contentTypeSchema>
 </file>
 
-<file path=customXml/item2.xml><?xml version="1.0" encoding="utf-8"?>
-<p:properties xmlns:p="http://schemas.microsoft.com/office/2006/metadata/properties" xmlns:xsi="http://www.w3.org/2001/XMLSchema-instance" xmlns:pc="http://schemas.microsoft.com/office/infopath/2007/PartnerControls">
-  <documentManagement>
-    <_activity xmlns="92c41bee-f0ee-4aa6-9399-a35fbb883510" xsi:nil="true"/>
-  </documentManagement>
-</p:properties>
-</file>
-
 <file path=customXml/item3.xml><?xml version="1.0" encoding="utf-8"?>
 <?mso-contentType ?>
 <FormTemplates xmlns="http://schemas.microsoft.com/sharepoint/v3/contenttype/forms">
@@ -35183,6 +34939,23 @@
 </file>
 
 <file path=customXml/itemProps1.xml><?xml version="1.0" encoding="utf-8"?>
+<ds:datastoreItem xmlns:ds="http://schemas.openxmlformats.org/officeDocument/2006/customXml" ds:itemID="{40B144E4-EB8A-4FA0-8858-53967A2814D9}">
+  <ds:schemaRefs>
+    <ds:schemaRef ds:uri="http://schemas.microsoft.com/office/2006/metadata/properties"/>
+    <ds:schemaRef ds:uri="e06ed288-fd75-4b50-bbed-f5a5df88c31c"/>
+    <ds:schemaRef ds:uri="92c41bee-f0ee-4aa6-9399-a35fbb883510"/>
+    <ds:schemaRef ds:uri="http://schemas.microsoft.com/office/2006/documentManagement/types"/>
+    <ds:schemaRef ds:uri="http://purl.org/dc/dcmitype/"/>
+    <ds:schemaRef ds:uri="http://purl.org/dc/elements/1.1/"/>
+    <ds:schemaRef ds:uri="http://www.w3.org/XML/1998/namespace"/>
+    <ds:schemaRef ds:uri="http://schemas.microsoft.com/office/infopath/2007/PartnerControls"/>
+    <ds:schemaRef ds:uri="http://schemas.openxmlformats.org/package/2006/metadata/core-properties"/>
+    <ds:schemaRef ds:uri="http://purl.org/dc/terms/"/>
+  </ds:schemaRefs>
+</ds:datastoreItem>
+</file>
+
+<file path=customXml/itemProps2.xml><?xml version="1.0" encoding="utf-8"?>
 <ds:datastoreItem xmlns:ds="http://schemas.openxmlformats.org/officeDocument/2006/customXml" ds:itemID="{4E37624A-CB4C-4775-9D5B-87C3560EF408}">
   <ds:schemaRefs>
     <ds:schemaRef ds:uri="http://schemas.microsoft.com/office/2006/metadata/contentType"/>
@@ -35201,23 +34974,6 @@
 </ds:datastoreItem>
 </file>
 
-<file path=customXml/itemProps2.xml><?xml version="1.0" encoding="utf-8"?>
-<ds:datastoreItem xmlns:ds="http://schemas.openxmlformats.org/officeDocument/2006/customXml" ds:itemID="{40B144E4-EB8A-4FA0-8858-53967A2814D9}">
-  <ds:schemaRefs>
-    <ds:schemaRef ds:uri="http://schemas.microsoft.com/office/2006/documentManagement/types"/>
-    <ds:schemaRef ds:uri="http://schemas.microsoft.com/office/2006/metadata/properties"/>
-    <ds:schemaRef ds:uri="http://purl.org/dc/terms/"/>
-    <ds:schemaRef ds:uri="http://purl.org/dc/elements/1.1/"/>
-    <ds:schemaRef ds:uri="http://schemas.microsoft.com/office/infopath/2007/PartnerControls"/>
-    <ds:schemaRef ds:uri="http://schemas.openxmlformats.org/package/2006/metadata/core-properties"/>
-    <ds:schemaRef ds:uri="http://purl.org/dc/dcmitype/"/>
-    <ds:schemaRef ds:uri="e06ed288-fd75-4b50-bbed-f5a5df88c31c"/>
-    <ds:schemaRef ds:uri="92c41bee-f0ee-4aa6-9399-a35fbb883510"/>
-    <ds:schemaRef ds:uri="http://www.w3.org/XML/1998/namespace"/>
-  </ds:schemaRefs>
-</ds:datastoreItem>
-</file>
-
 <file path=customXml/itemProps3.xml><?xml version="1.0" encoding="utf-8"?>
 <ds:datastoreItem xmlns:ds="http://schemas.openxmlformats.org/officeDocument/2006/customXml" ds:itemID="{2E2291BD-DFC5-49CA-979A-25104A0406FD}">
   <ds:schemaRefs>

</xml_diff>